<commit_message>
Updated templates example templates for new template context
</commit_message>
<xml_diff>
--- a/DOCS/sample_reports/template.pptx
+++ b/DOCS/sample_reports/template.pptx
@@ -212,7 +212,7 @@
           <a:p>
             <a:fld id="{F655BFE0-ECC4-8C48-AAA2-E89F961E7295}" type="datetimeFigureOut">
               <a:rPr lang="en-US" smtClean="0"/>
-              <a:t>10/22/20</a:t>
+              <a:t>3/25/21</a:t>
             </a:fld>
             <a:endParaRPr lang="en-US"/>
           </a:p>
@@ -389,7 +389,7 @@
           <a:p>
             <a:fld id="{238C35A0-2413-3B4F-BA04-92FA81CCB656}" type="datetimeFigureOut">
               <a:rPr lang="en-US" smtClean="0"/>
-              <a:t>10/22/20</a:t>
+              <a:t>3/25/21</a:t>
             </a:fld>
             <a:endParaRPr lang="en-US"/>
           </a:p>
@@ -1184,7 +1184,7 @@
             <a:fld id="{B19BF9E0-23D0-AA4D-9EB9-DD4CE800D881}" type="datetime1">
               <a:rPr lang="en-US" smtClean="0"/>
               <a:pPr/>
-              <a:t>10/22/20</a:t>
+              <a:t>3/25/21</a:t>
             </a:fld>
             <a:endParaRPr lang="en-US" dirty="0"/>
           </a:p>
@@ -1390,7 +1390,7 @@
             <a:fld id="{5E61854F-676F-4C40-8515-1AF6D823C89B}" type="datetime1">
               <a:rPr lang="en-US" smtClean="0"/>
               <a:pPr/>
-              <a:t>10/22/20</a:t>
+              <a:t>3/25/21</a:t>
             </a:fld>
             <a:endParaRPr lang="en-US" dirty="0"/>
           </a:p>
@@ -1606,7 +1606,7 @@
             <a:fld id="{F13DCD3E-A640-024C-94F5-F73CCF6B7E94}" type="datetime1">
               <a:rPr lang="en-US" smtClean="0"/>
               <a:pPr/>
-              <a:t>10/22/20</a:t>
+              <a:t>3/25/21</a:t>
             </a:fld>
             <a:endParaRPr lang="en-US" dirty="0"/>
           </a:p>
@@ -2058,7 +2058,18 @@
                 <a:ea typeface="Calibri" charset="0"/>
                 <a:cs typeface="Calibri" charset="0"/>
               </a:rPr>
-              <a:t>@ghostwriter</a:t>
+              <a:t>@</a:t>
+            </a:r>
+            <a:r>
+              <a:rPr lang="en-US" sz="2400" dirty="0" err="1">
+                <a:solidFill>
+                  <a:srgbClr val="FFFFFF"/>
+                </a:solidFill>
+                <a:latin typeface="Calibri" charset="0"/>
+                <a:ea typeface="Calibri" charset="0"/>
+                <a:cs typeface="Calibri" charset="0"/>
+              </a:rPr>
+              <a:t>getghostwriter</a:t>
             </a:r>
             <a:br>
               <a:rPr lang="en-US" sz="2400" dirty="0">
@@ -2309,7 +2320,7 @@
             <a:fld id="{01A07ABA-737E-B940-885E-88FDAFE88ADA}" type="datetime1">
               <a:rPr lang="en-US" smtClean="0"/>
               <a:pPr/>
-              <a:t>10/22/20</a:t>
+              <a:t>3/25/21</a:t>
             </a:fld>
             <a:endParaRPr lang="en-US" dirty="0"/>
           </a:p>
@@ -2600,7 +2611,7 @@
             <a:fld id="{8AD19A97-9375-5242-A8F8-EF9FB329B087}" type="datetime1">
               <a:rPr lang="en-US" smtClean="0"/>
               <a:pPr/>
-              <a:t>10/22/20</a:t>
+              <a:t>3/25/21</a:t>
             </a:fld>
             <a:endParaRPr lang="en-US" dirty="0"/>
           </a:p>
@@ -3167,7 +3178,7 @@
             <a:fld id="{70CCD242-71D9-0B41-89CE-88A9D4CFE536}" type="datetime1">
               <a:rPr lang="en-US" smtClean="0"/>
               <a:pPr/>
-              <a:t>10/22/20</a:t>
+              <a:t>3/25/21</a:t>
             </a:fld>
             <a:endParaRPr lang="en-US" dirty="0"/>
           </a:p>
@@ -3569,7 +3580,7 @@
             <a:fld id="{0238D314-2C76-E844-98B1-DB8FFB9F51BE}" type="datetime1">
               <a:rPr lang="en-US" smtClean="0"/>
               <a:pPr/>
-              <a:t>10/22/20</a:t>
+              <a:t>3/25/21</a:t>
             </a:fld>
             <a:endParaRPr lang="en-US" dirty="0"/>
           </a:p>
@@ -3724,7 +3735,7 @@
             <a:fld id="{0301FEA2-222B-174C-99C9-5F99D67544F0}" type="datetime1">
               <a:rPr lang="en-US" smtClean="0"/>
               <a:pPr/>
-              <a:t>10/22/20</a:t>
+              <a:t>3/25/21</a:t>
             </a:fld>
             <a:endParaRPr lang="en-US" dirty="0"/>
           </a:p>
@@ -3857,7 +3868,7 @@
             <a:fld id="{2539763C-9DA3-3A45-83CD-E398A8334719}" type="datetime1">
               <a:rPr lang="en-US" smtClean="0"/>
               <a:pPr/>
-              <a:t>10/22/20</a:t>
+              <a:t>3/25/21</a:t>
             </a:fld>
             <a:endParaRPr lang="en-US" dirty="0"/>
           </a:p>
@@ -4170,7 +4181,7 @@
             <a:fld id="{343D8E90-9D5D-BC44-A133-7984A60C94F9}" type="datetime1">
               <a:rPr lang="en-US" smtClean="0"/>
               <a:pPr/>
-              <a:t>10/22/20</a:t>
+              <a:t>3/25/21</a:t>
             </a:fld>
             <a:endParaRPr lang="en-US" dirty="0"/>
           </a:p>

</xml_diff>

<commit_message>
Updated stock template to demo changes to footers
</commit_message>
<xml_diff>
--- a/DOCS/sample_reports/template.pptx
+++ b/DOCS/sample_reports/template.pptx
@@ -1,6 +1,6 @@
 
 <file path=ppt/presentation.xml><?xml version="1.0" encoding="utf-8"?>
-<p:presentation xmlns:a="http://schemas.openxmlformats.org/drawingml/2006/main" xmlns:r="http://schemas.openxmlformats.org/officeDocument/2006/relationships" xmlns:p="http://schemas.openxmlformats.org/presentationml/2006/main" saveSubsetFonts="1" autoCompressPictures="0">
+<p:presentation xmlns:a="http://schemas.openxmlformats.org/drawingml/2006/main" xmlns:r="http://schemas.openxmlformats.org/officeDocument/2006/relationships" xmlns:p="http://schemas.openxmlformats.org/presentationml/2006/main" showSpecialPlsOnTitleSld="0" saveSubsetFonts="1" autoCompressPictures="0">
   <p:sldMasterIdLst>
     <p:sldMasterId id="2147483648" r:id="rId1"/>
   </p:sldMasterIdLst>
@@ -212,7 +212,7 @@
           <a:p>
             <a:fld id="{F655BFE0-ECC4-8C48-AAA2-E89F961E7295}" type="datetimeFigureOut">
               <a:rPr lang="en-US" smtClean="0"/>
-              <a:t>3/25/21</a:t>
+              <a:t>2/20/24</a:t>
             </a:fld>
             <a:endParaRPr lang="en-US"/>
           </a:p>
@@ -389,7 +389,7 @@
           <a:p>
             <a:fld id="{238C35A0-2413-3B4F-BA04-92FA81CCB656}" type="datetimeFigureOut">
               <a:rPr lang="en-US" smtClean="0"/>
-              <a:t>3/25/21</a:t>
+              <a:t>2/20/24</a:t>
             </a:fld>
             <a:endParaRPr lang="en-US"/>
           </a:p>
@@ -681,7 +681,7 @@
         </p:nvSpPr>
         <p:spPr>
           <a:xfrm>
-            <a:off x="-10160" y="-10160"/>
+            <a:off x="-10160" y="248258"/>
             <a:ext cx="12202160" cy="6868160"/>
           </a:xfrm>
           <a:prstGeom prst="rect">
@@ -840,10 +840,9 @@
           <a:lstStyle/>
           <a:p>
             <a:r>
-              <a:rPr lang="mr-IN"/>
-              <a:t>-‹#›- </a:t>
-            </a:r>
-            <a:endParaRPr lang="en-US"/>
+              <a:rPr lang="en-US"/>
+              <a:t>Automated Report Output by Ghostwriter</a:t>
+            </a:r>
           </a:p>
         </p:txBody>
       </p:sp>
@@ -919,10 +918,10 @@
       </p:cxnSp>
       <p:pic>
         <p:nvPicPr>
-          <p:cNvPr id="7" name="Picture 6">
+          <p:cNvPr id="6" name="Picture 5" descr="A cartoon of a purple ghost&#10;&#10;Description automatically generated">
             <a:extLst>
               <a:ext uri="{FF2B5EF4-FFF2-40B4-BE49-F238E27FC236}">
-                <a16:creationId xmlns:a16="http://schemas.microsoft.com/office/drawing/2014/main" id="{EAA465BC-D4F2-F54B-BCA6-1D2FA476AE2B}"/>
+                <a16:creationId xmlns:a16="http://schemas.microsoft.com/office/drawing/2014/main" id="{2D66B889-03FC-6FF9-EB19-D58ACC5B64E2}"/>
               </a:ext>
             </a:extLst>
           </p:cNvPr>
@@ -939,8 +938,8 @@
         </p:blipFill>
         <p:spPr>
           <a:xfrm>
-            <a:off x="4832560" y="439921"/>
-            <a:ext cx="2552700" cy="2743200"/>
+            <a:off x="5290009" y="817020"/>
+            <a:ext cx="1601821" cy="1828800"/>
           </a:xfrm>
           <a:prstGeom prst="rect">
             <a:avLst/>
@@ -1181,11 +1180,6 @@
             </a:lvl1pPr>
           </a:lstStyle>
           <a:p>
-            <a:fld id="{B19BF9E0-23D0-AA4D-9EB9-DD4CE800D881}" type="datetime1">
-              <a:rPr lang="en-US" smtClean="0"/>
-              <a:pPr/>
-              <a:t>3/25/21</a:t>
-            </a:fld>
             <a:endParaRPr lang="en-US" dirty="0"/>
           </a:p>
         </p:txBody>
@@ -1206,10 +1200,9 @@
           <a:lstStyle/>
           <a:p>
             <a:r>
-              <a:rPr lang="mr-IN"/>
-              <a:t>-‹#›- </a:t>
-            </a:r>
-            <a:endParaRPr lang="en-US"/>
+              <a:rPr lang="en-US"/>
+              <a:t>Automated Report Output by Ghostwriter</a:t>
+            </a:r>
           </a:p>
         </p:txBody>
       </p:sp>
@@ -1387,11 +1380,6 @@
             </a:lvl1pPr>
           </a:lstStyle>
           <a:p>
-            <a:fld id="{5E61854F-676F-4C40-8515-1AF6D823C89B}" type="datetime1">
-              <a:rPr lang="en-US" smtClean="0"/>
-              <a:pPr/>
-              <a:t>3/25/21</a:t>
-            </a:fld>
             <a:endParaRPr lang="en-US" dirty="0"/>
           </a:p>
         </p:txBody>
@@ -1412,10 +1400,9 @@
           <a:lstStyle/>
           <a:p>
             <a:r>
-              <a:rPr lang="mr-IN"/>
-              <a:t>-‹#›- </a:t>
-            </a:r>
-            <a:endParaRPr lang="en-US"/>
+              <a:rPr lang="en-US"/>
+              <a:t>Automated Report Output by Ghostwriter</a:t>
+            </a:r>
           </a:p>
         </p:txBody>
       </p:sp>
@@ -1603,11 +1590,6 @@
             </a:lvl1pPr>
           </a:lstStyle>
           <a:p>
-            <a:fld id="{F13DCD3E-A640-024C-94F5-F73CCF6B7E94}" type="datetime1">
-              <a:rPr lang="en-US" smtClean="0"/>
-              <a:pPr/>
-              <a:t>3/25/21</a:t>
-            </a:fld>
             <a:endParaRPr lang="en-US" dirty="0"/>
           </a:p>
         </p:txBody>
@@ -1628,10 +1610,9 @@
           <a:lstStyle/>
           <a:p>
             <a:r>
-              <a:rPr lang="mr-IN"/>
-              <a:t>-‹#›- </a:t>
-            </a:r>
-            <a:endParaRPr lang="en-US"/>
+              <a:rPr lang="en-US"/>
+              <a:t>Automated Report Output by Ghostwriter</a:t>
+            </a:r>
           </a:p>
         </p:txBody>
       </p:sp>
@@ -1721,10 +1702,9 @@
           <a:lstStyle/>
           <a:p>
             <a:r>
-              <a:rPr lang="mr-IN"/>
-              <a:t>-‹#›- </a:t>
-            </a:r>
-            <a:endParaRPr lang="en-US"/>
+              <a:rPr lang="en-US"/>
+              <a:t>Automated Report Output by Ghostwriter</a:t>
+            </a:r>
           </a:p>
         </p:txBody>
       </p:sp>
@@ -2306,10 +2286,10 @@
           </a:prstGeom>
         </p:spPr>
         <p:txBody>
-          <a:bodyPr/>
+          <a:bodyPr anchor="ctr"/>
           <a:lstStyle>
             <a:lvl1pPr>
-              <a:defRPr>
+              <a:defRPr sz="1200">
                 <a:solidFill>
                   <a:schemeClr val="bg1"/>
                 </a:solidFill>
@@ -2317,11 +2297,6 @@
             </a:lvl1pPr>
           </a:lstStyle>
           <a:p>
-            <a:fld id="{01A07ABA-737E-B940-885E-88FDAFE88ADA}" type="datetime1">
-              <a:rPr lang="en-US" smtClean="0"/>
-              <a:pPr/>
-              <a:t>3/25/21</a:t>
-            </a:fld>
             <a:endParaRPr lang="en-US" dirty="0"/>
           </a:p>
         </p:txBody>
@@ -2343,16 +2318,7 @@
           <a:p>
             <a:r>
               <a:rPr lang="en-US" dirty="0"/>
-              <a:t>-</a:t>
-            </a:r>
-            <a:fld id="{41C2014F-285C-ED4C-98BB-79F1020C591C}" type="slidenum">
-              <a:rPr lang="en-US" smtClean="0"/>
-              <a:pPr/>
-              <a:t>‹#›</a:t>
-            </a:fld>
-            <a:r>
-              <a:rPr lang="en-US" dirty="0"/>
-              <a:t>- </a:t>
+              <a:t>Automated Report Output by Ghostwriter</a:t>
             </a:r>
           </a:p>
         </p:txBody>
@@ -2377,10 +2343,10 @@
           </a:prstGeom>
         </p:spPr>
         <p:txBody>
-          <a:bodyPr/>
+          <a:bodyPr anchor="ctr"/>
           <a:lstStyle>
             <a:lvl1pPr algn="r">
-              <a:defRPr>
+              <a:defRPr sz="1200">
                 <a:solidFill>
                   <a:schemeClr val="bg1"/>
                 </a:solidFill>
@@ -2608,11 +2574,6 @@
             </a:lvl1pPr>
           </a:lstStyle>
           <a:p>
-            <a:fld id="{8AD19A97-9375-5242-A8F8-EF9FB329B087}" type="datetime1">
-              <a:rPr lang="en-US" smtClean="0"/>
-              <a:pPr/>
-              <a:t>3/25/21</a:t>
-            </a:fld>
             <a:endParaRPr lang="en-US" dirty="0"/>
           </a:p>
         </p:txBody>
@@ -2633,10 +2594,9 @@
           <a:lstStyle/>
           <a:p>
             <a:r>
-              <a:rPr lang="mr-IN"/>
-              <a:t>-‹#›- </a:t>
-            </a:r>
-            <a:endParaRPr lang="en-US"/>
+              <a:rPr lang="en-US"/>
+              <a:t>Automated Report Output by Ghostwriter</a:t>
+            </a:r>
           </a:p>
         </p:txBody>
       </p:sp>
@@ -2878,10 +2838,9 @@
           <a:lstStyle/>
           <a:p>
             <a:r>
-              <a:rPr lang="mr-IN"/>
-              <a:t>-‹#›- </a:t>
-            </a:r>
-            <a:endParaRPr lang="en-US"/>
+              <a:rPr lang="en-US"/>
+              <a:t>Automated Report Output by Ghostwriter</a:t>
+            </a:r>
           </a:p>
         </p:txBody>
       </p:sp>
@@ -3175,11 +3134,6 @@
             </a:lvl1pPr>
           </a:lstStyle>
           <a:p>
-            <a:fld id="{70CCD242-71D9-0B41-89CE-88A9D4CFE536}" type="datetime1">
-              <a:rPr lang="en-US" smtClean="0"/>
-              <a:pPr/>
-              <a:t>3/25/21</a:t>
-            </a:fld>
             <a:endParaRPr lang="en-US" dirty="0"/>
           </a:p>
         </p:txBody>
@@ -3200,10 +3154,9 @@
           <a:lstStyle/>
           <a:p>
             <a:r>
-              <a:rPr lang="mr-IN"/>
-              <a:t>-‹#›- </a:t>
-            </a:r>
-            <a:endParaRPr lang="en-US"/>
+              <a:rPr lang="en-US"/>
+              <a:t>Automated Report Output by Ghostwriter</a:t>
+            </a:r>
           </a:p>
         </p:txBody>
       </p:sp>
@@ -3577,11 +3530,6 @@
             </a:lvl1pPr>
           </a:lstStyle>
           <a:p>
-            <a:fld id="{0238D314-2C76-E844-98B1-DB8FFB9F51BE}" type="datetime1">
-              <a:rPr lang="en-US" smtClean="0"/>
-              <a:pPr/>
-              <a:t>3/25/21</a:t>
-            </a:fld>
             <a:endParaRPr lang="en-US" dirty="0"/>
           </a:p>
         </p:txBody>
@@ -3602,10 +3550,9 @@
           <a:lstStyle/>
           <a:p>
             <a:r>
-              <a:rPr lang="mr-IN"/>
-              <a:t>-‹#›- </a:t>
-            </a:r>
-            <a:endParaRPr lang="en-US"/>
+              <a:rPr lang="en-US"/>
+              <a:t>Automated Report Output by Ghostwriter</a:t>
+            </a:r>
           </a:p>
         </p:txBody>
       </p:sp>
@@ -3732,11 +3679,6 @@
             </a:lvl1pPr>
           </a:lstStyle>
           <a:p>
-            <a:fld id="{0301FEA2-222B-174C-99C9-5F99D67544F0}" type="datetime1">
-              <a:rPr lang="en-US" smtClean="0"/>
-              <a:pPr/>
-              <a:t>3/25/21</a:t>
-            </a:fld>
             <a:endParaRPr lang="en-US" dirty="0"/>
           </a:p>
         </p:txBody>
@@ -3757,10 +3699,9 @@
           <a:lstStyle/>
           <a:p>
             <a:r>
-              <a:rPr lang="mr-IN"/>
-              <a:t>-‹#›- </a:t>
-            </a:r>
-            <a:endParaRPr lang="en-US"/>
+              <a:rPr lang="en-US"/>
+              <a:t>Automated Report Output by Ghostwriter</a:t>
+            </a:r>
           </a:p>
         </p:txBody>
       </p:sp>
@@ -3865,11 +3806,6 @@
             </a:lvl1pPr>
           </a:lstStyle>
           <a:p>
-            <a:fld id="{2539763C-9DA3-3A45-83CD-E398A8334719}" type="datetime1">
-              <a:rPr lang="en-US" smtClean="0"/>
-              <a:pPr/>
-              <a:t>3/25/21</a:t>
-            </a:fld>
             <a:endParaRPr lang="en-US" dirty="0"/>
           </a:p>
         </p:txBody>
@@ -3890,10 +3826,9 @@
           <a:lstStyle/>
           <a:p>
             <a:r>
-              <a:rPr lang="mr-IN"/>
-              <a:t>-‹#›- </a:t>
-            </a:r>
-            <a:endParaRPr lang="en-US"/>
+              <a:rPr lang="en-US"/>
+              <a:t>Automated Report Output by Ghostwriter</a:t>
+            </a:r>
           </a:p>
         </p:txBody>
       </p:sp>
@@ -4178,11 +4113,6 @@
             </a:lvl1pPr>
           </a:lstStyle>
           <a:p>
-            <a:fld id="{343D8E90-9D5D-BC44-A133-7984A60C94F9}" type="datetime1">
-              <a:rPr lang="en-US" smtClean="0"/>
-              <a:pPr/>
-              <a:t>3/25/21</a:t>
-            </a:fld>
             <a:endParaRPr lang="en-US" dirty="0"/>
           </a:p>
         </p:txBody>
@@ -4203,10 +4133,9 @@
           <a:lstStyle/>
           <a:p>
             <a:r>
-              <a:rPr lang="mr-IN"/>
-              <a:t>-‹#›- </a:t>
-            </a:r>
-            <a:endParaRPr lang="en-US"/>
+              <a:rPr lang="en-US"/>
+              <a:t>Automated Report Output by Ghostwriter</a:t>
+            </a:r>
           </a:p>
         </p:txBody>
       </p:sp>
@@ -4329,7 +4258,7 @@
           <a:lstStyle/>
           <a:p>
             <a:pPr algn="ctr"/>
-            <a:endParaRPr lang="en-US"/>
+            <a:endParaRPr lang="en-US" dirty="0"/>
           </a:p>
         </p:txBody>
       </p:sp>
@@ -4448,8 +4377,22 @@
         <p:txBody>
           <a:bodyPr vert="horz" lIns="91440" tIns="45720" rIns="91440" bIns="45720" rtlCol="0" anchor="ctr"/>
           <a:lstStyle>
-            <a:lvl1pPr algn="ctr">
-              <a:defRPr sz="1200">
+            <a:lvl1pPr marL="0" marR="0" indent="0" algn="ctr" defTabSz="914400" rtl="0" eaLnBrk="1" fontAlgn="auto" latinLnBrk="0" hangingPunct="1">
+              <a:lnSpc>
+                <a:spcPct val="100000"/>
+              </a:lnSpc>
+              <a:spcBef>
+                <a:spcPts val="0"/>
+              </a:spcBef>
+              <a:spcAft>
+                <a:spcPts val="0"/>
+              </a:spcAft>
+              <a:buClrTx/>
+              <a:buSzTx/>
+              <a:buFontTx/>
+              <a:buNone/>
+              <a:tabLst/>
+              <a:defRPr sz="1200" b="1">
                 <a:solidFill>
                   <a:schemeClr val="bg1"/>
                 </a:solidFill>
@@ -4459,16 +4402,7 @@
           <a:p>
             <a:r>
               <a:rPr lang="en-US" dirty="0"/>
-              <a:t>-</a:t>
-            </a:r>
-            <a:fld id="{41C2014F-285C-ED4C-98BB-79F1020C591C}" type="slidenum">
-              <a:rPr lang="en-US" smtClean="0"/>
-              <a:pPr/>
-              <a:t>‹#›</a:t>
-            </a:fld>
-            <a:r>
-              <a:rPr lang="en-US" dirty="0"/>
-              <a:t>- </a:t>
+              <a:t>Automated Report Output by Ghostwriter</a:t>
             </a:r>
           </a:p>
         </p:txBody>
@@ -4572,7 +4506,7 @@
     <p:sldLayoutId id="2147483659" r:id="rId12"/>
     <p:sldLayoutId id="2147483676" r:id="rId13"/>
   </p:sldLayoutIdLst>
-  <p:hf sldNum="0" hdr="0" dt="0"/>
+  <p:hf hdr="0" dt="0"/>
   <p:txStyles>
     <p:titleStyle>
       <a:lvl1pPr algn="l" defTabSz="914400" rtl="0" eaLnBrk="1" latinLnBrk="0" hangingPunct="1">

</xml_diff>